<commit_message>
minor changes in ppt
</commit_message>
<xml_diff>
--- a/docs/ppt/phase-1/ppt phase-1.pptx
+++ b/docs/ppt/phase-1/ppt phase-1.pptx
@@ -4658,10 +4658,10 @@
             </a:lnSpc>
           </a:pPr>
           <a:r>
-            <a:rPr lang="en-IN" b="1"/>
+            <a:rPr lang="en-IN" b="1" dirty="0"/>
             <a:t>INTRODUCTION</a:t>
           </a:r>
-          <a:endParaRPr lang="en-US"/>
+          <a:endParaRPr lang="en-US" dirty="0"/>
         </a:p>
       </dgm:t>
     </dgm:pt>
@@ -5756,10 +5756,10 @@
         <a:lstStyle/>
         <a:p>
           <a:r>
-            <a:rPr lang="en-IN" b="1"/>
+            <a:rPr lang="en-IN" b="1" dirty="0"/>
             <a:t>Software Testing (18IS62) :</a:t>
           </a:r>
-          <a:endParaRPr lang="en-US"/>
+          <a:endParaRPr lang="en-US" dirty="0"/>
         </a:p>
       </dgm:t>
     </dgm:pt>
@@ -5793,10 +5793,10 @@
         <a:lstStyle/>
         <a:p>
           <a:r>
-            <a:rPr lang="en-IN"/>
+            <a:rPr lang="en-IN" dirty="0"/>
             <a:t>The codes are tested for all possible bugs and logical failures with the help of black box and white box testing methodologies.</a:t>
           </a:r>
-          <a:endParaRPr lang="en-US"/>
+          <a:endParaRPr lang="en-US" dirty="0"/>
         </a:p>
       </dgm:t>
     </dgm:pt>
@@ -5948,7 +5948,7 @@
       <dgm:spPr/>
     </dgm:pt>
     <dgm:pt modelId="{7D5B4AF8-E91D-4E16-9A67-2F6D9DC990C7}" type="pres">
-      <dgm:prSet presAssocID="{5ABB316A-63A3-4284-AB60-BBA2D1563614}" presName="parentText" presStyleLbl="node1" presStyleIdx="1" presStyleCnt="3">
+      <dgm:prSet presAssocID="{5ABB316A-63A3-4284-AB60-BBA2D1563614}" presName="parentText" presStyleLbl="node1" presStyleIdx="1" presStyleCnt="3" custLinFactNeighborX="-21739" custLinFactNeighborY="2818">
         <dgm:presLayoutVars>
           <dgm:chMax val="0"/>
           <dgm:bulletEnabled val="1"/>
@@ -5961,7 +5961,7 @@
       <dgm:spPr/>
     </dgm:pt>
     <dgm:pt modelId="{AD0E395C-D3BB-4FA8-A9BE-58323968D24E}" type="pres">
-      <dgm:prSet presAssocID="{5ABB316A-63A3-4284-AB60-BBA2D1563614}" presName="childText" presStyleLbl="conFgAcc1" presStyleIdx="1" presStyleCnt="3">
+      <dgm:prSet presAssocID="{5ABB316A-63A3-4284-AB60-BBA2D1563614}" presName="childText" presStyleLbl="conFgAcc1" presStyleIdx="1" presStyleCnt="3" custLinFactNeighborX="0" custLinFactNeighborY="-15402">
         <dgm:presLayoutVars>
           <dgm:bulletEnabled val="1"/>
         </dgm:presLayoutVars>
@@ -5981,7 +5981,7 @@
       <dgm:spPr/>
     </dgm:pt>
     <dgm:pt modelId="{C48E5740-ACF4-4809-BA49-88B32C9F1A3C}" type="pres">
-      <dgm:prSet presAssocID="{2DE40025-AB42-4885-BBC4-94E5011E8B9F}" presName="parentText" presStyleLbl="node1" presStyleIdx="2" presStyleCnt="3">
+      <dgm:prSet presAssocID="{2DE40025-AB42-4885-BBC4-94E5011E8B9F}" presName="parentText" presStyleLbl="node1" presStyleIdx="2" presStyleCnt="3" custLinFactNeighborX="-40640" custLinFactNeighborY="9864">
         <dgm:presLayoutVars>
           <dgm:chMax val="0"/>
           <dgm:bulletEnabled val="1"/>
@@ -5994,7 +5994,7 @@
       <dgm:spPr/>
     </dgm:pt>
     <dgm:pt modelId="{B0BC73CF-626B-476A-A71F-56D11BE6E558}" type="pres">
-      <dgm:prSet presAssocID="{2DE40025-AB42-4885-BBC4-94E5011E8B9F}" presName="childText" presStyleLbl="conFgAcc1" presStyleIdx="2" presStyleCnt="3">
+      <dgm:prSet presAssocID="{2DE40025-AB42-4885-BBC4-94E5011E8B9F}" presName="childText" presStyleLbl="conFgAcc1" presStyleIdx="2" presStyleCnt="3" custLinFactNeighborX="0" custLinFactNeighborY="29342">
         <dgm:presLayoutVars>
           <dgm:bulletEnabled val="1"/>
         </dgm:presLayoutVars>
@@ -6510,7 +6510,7 @@
 <dgm:dataModel xmlns:dgm="http://schemas.openxmlformats.org/drawingml/2006/diagram" xmlns:a="http://schemas.openxmlformats.org/drawingml/2006/main">
   <dgm:ptLst>
     <dgm:pt modelId="{1BC0DA22-A3A2-4496-8A7C-E4C4C72E1C1C}" type="doc">
-      <dgm:prSet loTypeId="urn:microsoft.com/office/officeart/2005/8/layout/vList2" loCatId="list" qsTypeId="urn:microsoft.com/office/officeart/2005/8/quickstyle/simple1" qsCatId="simple" csTypeId="urn:microsoft.com/office/officeart/2005/8/colors/accent1_2" csCatId="accent1"/>
+      <dgm:prSet loTypeId="urn:microsoft.com/office/officeart/2005/8/layout/vList2" loCatId="list" qsTypeId="urn:microsoft.com/office/officeart/2005/8/quickstyle/simple1" qsCatId="simple" csTypeId="urn:microsoft.com/office/officeart/2005/8/colors/accent1_2" csCatId="accent1" phldr="1"/>
       <dgm:spPr/>
       <dgm:t>
         <a:bodyPr/>
@@ -6528,16 +6528,34 @@
         <a:lstStyle/>
         <a:p>
           <a:r>
-            <a:rPr lang="en-IN"/>
-            <a:t>C. Ng, S. Cheong, E. Haji mohammad hosseinmemar and W. Yap, "Mobile outdoor parking space detection application," 2017 IEEE 8th Control and System Graduate Research Colloquium (ICSGRC), 2017, pp. 81-86, doi: 10.1109/ICSGRC.2017.8070573.</a:t>
+            <a:rPr lang="en-IN" dirty="0"/>
+            <a:t>C. Ng, S. Cheong, E. Haji </a:t>
           </a:r>
           <a:r>
-            <a:rPr lang="en-IN" u="sng">
-              <a:hlinkClick xmlns:r="http://schemas.openxmlformats.org/officeDocument/2006/relationships" r:id="rId1"/>
-            </a:rPr>
-            <a:t>https://ieeexplore.ieee.org/document/8070573</a:t>
+            <a:rPr lang="en-IN" dirty="0" err="1"/>
+            <a:t>mohammad</a:t>
           </a:r>
-          <a:endParaRPr lang="en-US"/>
+          <a:r>
+            <a:rPr lang="en-IN" dirty="0"/>
+            <a:t> </a:t>
+          </a:r>
+          <a:r>
+            <a:rPr lang="en-IN" dirty="0" err="1"/>
+            <a:t>hosseinmemar</a:t>
+          </a:r>
+          <a:r>
+            <a:rPr lang="en-IN" dirty="0"/>
+            <a:t> and W. Yap, "Mobile outdoor parking space detection application," 2017 IEEE 8th Control and System Graduate Research Colloquium (ICSGRC), 2017, pp. 81-86, </a:t>
+          </a:r>
+          <a:r>
+            <a:rPr lang="en-IN" dirty="0" err="1"/>
+            <a:t>doi</a:t>
+          </a:r>
+          <a:r>
+            <a:rPr lang="en-IN" dirty="0"/>
+            <a:t>: 10.1109/ICSGRC.2017.8070573.</a:t>
+          </a:r>
+          <a:endParaRPr lang="en-US" dirty="0"/>
         </a:p>
       </dgm:t>
     </dgm:pt>
@@ -6571,16 +6589,34 @@
         <a:lstStyle/>
         <a:p>
           <a:r>
-            <a:rPr lang="en-IN"/>
-            <a:t>B. K. Patil, A. Deshpande, S. Suryavanshi, R. Magdum and B. Manjunath, "Smart Parking System for Cars," 2018 International Conference on Recent Innovations in Electrical, Electronics &amp; Communication Engineering (ICRIEECE), 2018, pp. 1118-1121, doi: 10.1109/ICRIEECE44171.2018.9008662. </a:t>
+            <a:rPr lang="en-IN" dirty="0"/>
+            <a:t>B. K. Patil, A. Deshpande, S. </a:t>
           </a:r>
           <a:r>
-            <a:rPr lang="en-IN" u="sng">
-              <a:hlinkClick xmlns:r="http://schemas.openxmlformats.org/officeDocument/2006/relationships" r:id="rId2"/>
-            </a:rPr>
-            <a:t>https://ieeexplore.ieee.org/document/9008662</a:t>
+            <a:rPr lang="en-IN" dirty="0" err="1"/>
+            <a:t>Suryavanshi</a:t>
           </a:r>
-          <a:endParaRPr lang="en-US"/>
+          <a:r>
+            <a:rPr lang="en-IN" dirty="0"/>
+            <a:t>, R. </a:t>
+          </a:r>
+          <a:r>
+            <a:rPr lang="en-IN" dirty="0" err="1"/>
+            <a:t>Magdum</a:t>
+          </a:r>
+          <a:r>
+            <a:rPr lang="en-IN" dirty="0"/>
+            <a:t> and B. Manjunath, "Smart Parking System for Cars," 2018 International Conference on Recent Innovations in Electrical, Electronics &amp; Communication Engineering (ICRIEECE), 2018, pp. 1118-1121, </a:t>
+          </a:r>
+          <a:r>
+            <a:rPr lang="en-IN" dirty="0" err="1"/>
+            <a:t>doi</a:t>
+          </a:r>
+          <a:r>
+            <a:rPr lang="en-IN" dirty="0"/>
+            <a:t>: 10.1109/ICRIEECE44171.2018.9008662. </a:t>
+          </a:r>
+          <a:endParaRPr lang="en-US" dirty="0"/>
         </a:p>
       </dgm:t>
     </dgm:pt>
@@ -7007,10 +7043,10 @@
             <a:buNone/>
           </a:pPr>
           <a:r>
-            <a:rPr lang="en-IN" sz="2400" b="1" kern="1200"/>
+            <a:rPr lang="en-IN" sz="2400" b="1" kern="1200" dirty="0"/>
             <a:t>INTRODUCTION</a:t>
           </a:r>
-          <a:endParaRPr lang="en-US" sz="2400" kern="1200"/>
+          <a:endParaRPr lang="en-US" sz="2400" kern="1200" dirty="0"/>
         </a:p>
       </dsp:txBody>
       <dsp:txXfrm>
@@ -7798,7 +7834,7 @@
         </a:bodyPr>
         <a:lstStyle/>
         <a:p>
-          <a:pPr marL="0" lvl="0" indent="0" algn="l" defTabSz="844550">
+          <a:pPr marL="0" lvl="0" indent="0" algn="l" defTabSz="889000">
             <a:lnSpc>
               <a:spcPct val="100000"/>
             </a:lnSpc>
@@ -7811,7 +7847,7 @@
             <a:buNone/>
           </a:pPr>
           <a:r>
-            <a:rPr lang="en-US" sz="1900" kern="1200" dirty="0">
+            <a:rPr lang="en-US" sz="2000" kern="1200" dirty="0">
               <a:latin typeface="Open Sans" panose="020B0606030504020204" pitchFamily="34" charset="0"/>
               <a:ea typeface="Open Sans" panose="020B0606030504020204" pitchFamily="34" charset="0"/>
               <a:cs typeface="Open Sans" panose="020B0606030504020204" pitchFamily="34" charset="0"/>
@@ -7819,7 +7855,7 @@
             <a:t>Parking is one of the major challenge faced by urban areas</a:t>
           </a:r>
           <a:r>
-            <a:rPr lang="en-US" sz="1900" kern="1200" dirty="0"/>
+            <a:rPr lang="en-US" sz="2000" kern="1200" dirty="0"/>
             <a:t>.</a:t>
           </a:r>
         </a:p>
@@ -7965,7 +8001,7 @@
         </a:bodyPr>
         <a:lstStyle/>
         <a:p>
-          <a:pPr marL="0" lvl="0" indent="0" algn="l" defTabSz="844550">
+          <a:pPr marL="0" lvl="0" indent="0" algn="l" defTabSz="889000">
             <a:lnSpc>
               <a:spcPct val="100000"/>
             </a:lnSpc>
@@ -7978,14 +8014,14 @@
             <a:buNone/>
           </a:pPr>
           <a:r>
-            <a:rPr lang="en-IN" sz="1900" b="0" kern="1200" dirty="0">
+            <a:rPr lang="en-IN" sz="2000" b="0" kern="1200" dirty="0">
               <a:latin typeface="Open Sans" panose="020B0606030504020204" pitchFamily="34" charset="0"/>
               <a:ea typeface="Open Sans" panose="020B0606030504020204" pitchFamily="34" charset="0"/>
               <a:cs typeface="Open Sans" panose="020B0606030504020204" pitchFamily="34" charset="0"/>
             </a:rPr>
             <a:t>Reduce wastage of fuel and time.</a:t>
           </a:r>
-          <a:endParaRPr lang="en-US" sz="1900" kern="1200" dirty="0">
+          <a:endParaRPr lang="en-US" sz="2000" kern="1200" dirty="0">
             <a:latin typeface="Open Sans" panose="020B0606030504020204" pitchFamily="34" charset="0"/>
             <a:ea typeface="Open Sans" panose="020B0606030504020204" pitchFamily="34" charset="0"/>
             <a:cs typeface="Open Sans" panose="020B0606030504020204" pitchFamily="34" charset="0"/>
@@ -8133,7 +8169,7 @@
         </a:bodyPr>
         <a:lstStyle/>
         <a:p>
-          <a:pPr marL="0" lvl="0" indent="0" algn="l" defTabSz="844550">
+          <a:pPr marL="0" lvl="0" indent="0" algn="l" defTabSz="889000">
             <a:lnSpc>
               <a:spcPct val="100000"/>
             </a:lnSpc>
@@ -8146,7 +8182,7 @@
             <a:buNone/>
           </a:pPr>
           <a:r>
-            <a:rPr lang="en-IN" sz="1900" kern="1200" dirty="0">
+            <a:rPr lang="en-IN" sz="2000" kern="1200" dirty="0">
               <a:latin typeface="Open Sans" panose="020B0606030504020204" pitchFamily="34" charset="0"/>
               <a:ea typeface="Open Sans" panose="020B0606030504020204" pitchFamily="34" charset="0"/>
               <a:cs typeface="Open Sans" panose="020B0606030504020204" pitchFamily="34" charset="0"/>
@@ -8154,10 +8190,10 @@
             <a:t>Display Available Parking Space</a:t>
           </a:r>
           <a:r>
-            <a:rPr lang="en-IN" sz="1900" kern="1200" dirty="0"/>
+            <a:rPr lang="en-IN" sz="2000" kern="1200" dirty="0"/>
             <a:t>.</a:t>
           </a:r>
-          <a:endParaRPr lang="en-US" sz="1900" kern="1200" dirty="0"/>
+          <a:endParaRPr lang="en-US" sz="2000" kern="1200" dirty="0"/>
         </a:p>
       </dsp:txBody>
       <dsp:txXfrm>
@@ -8301,7 +8337,7 @@
         </a:bodyPr>
         <a:lstStyle/>
         <a:p>
-          <a:pPr marL="0" lvl="0" indent="0" algn="l" defTabSz="844550">
+          <a:pPr marL="0" lvl="0" indent="0" algn="l" defTabSz="889000">
             <a:lnSpc>
               <a:spcPct val="100000"/>
             </a:lnSpc>
@@ -8314,14 +8350,14 @@
             <a:buNone/>
           </a:pPr>
           <a:r>
-            <a:rPr lang="en-IN" sz="1900" b="0" kern="1200" dirty="0">
+            <a:rPr lang="en-IN" sz="2000" b="0" kern="1200" dirty="0">
               <a:latin typeface="Open Sans" panose="020B0606030504020204" pitchFamily="34" charset="0"/>
               <a:ea typeface="Open Sans" panose="020B0606030504020204" pitchFamily="34" charset="0"/>
               <a:cs typeface="Open Sans" panose="020B0606030504020204" pitchFamily="34" charset="0"/>
             </a:rPr>
             <a:t>Bill Generation for the parking time.</a:t>
           </a:r>
-          <a:endParaRPr lang="en-US" sz="1900" kern="1200" dirty="0">
+          <a:endParaRPr lang="en-US" sz="2000" kern="1200" dirty="0">
             <a:latin typeface="Open Sans" panose="020B0606030504020204" pitchFamily="34" charset="0"/>
             <a:ea typeface="Open Sans" panose="020B0606030504020204" pitchFamily="34" charset="0"/>
             <a:cs typeface="Open Sans" panose="020B0606030504020204" pitchFamily="34" charset="0"/>
@@ -8509,7 +8545,7 @@
       </dsp:nvSpPr>
       <dsp:spPr>
         <a:xfrm>
-          <a:off x="0" y="1659446"/>
+          <a:off x="0" y="1645307"/>
           <a:ext cx="7886699" cy="963900"/>
         </a:xfrm>
         <a:prstGeom prst="rect">
@@ -8569,14 +8605,14 @@
             <a:buChar char="•"/>
           </a:pPr>
           <a:r>
-            <a:rPr lang="en-IN" sz="1700" kern="1200"/>
+            <a:rPr lang="en-IN" sz="1700" kern="1200" dirty="0"/>
             <a:t>The codes are tested for all possible bugs and logical failures with the help of black box and white box testing methodologies.</a:t>
           </a:r>
-          <a:endParaRPr lang="en-US" sz="1700" kern="1200"/>
+          <a:endParaRPr lang="en-US" sz="1700" kern="1200" dirty="0"/>
         </a:p>
       </dsp:txBody>
       <dsp:txXfrm>
-        <a:off x="0" y="1659446"/>
+        <a:off x="0" y="1645307"/>
         <a:ext cx="7886699" cy="963900"/>
       </dsp:txXfrm>
     </dsp:sp>
@@ -8587,7 +8623,7 @@
       </dsp:nvSpPr>
       <dsp:spPr>
         <a:xfrm>
-          <a:off x="394334" y="1408526"/>
+          <a:off x="308610" y="1422668"/>
           <a:ext cx="5520689" cy="501840"/>
         </a:xfrm>
         <a:prstGeom prst="roundRect">
@@ -8648,14 +8684,14 @@
             <a:buNone/>
           </a:pPr>
           <a:r>
-            <a:rPr lang="en-IN" sz="1700" b="1" kern="1200"/>
+            <a:rPr lang="en-IN" sz="1700" b="1" kern="1200" dirty="0"/>
             <a:t>Software Testing (18IS62) :</a:t>
           </a:r>
-          <a:endParaRPr lang="en-US" sz="1700" kern="1200"/>
+          <a:endParaRPr lang="en-US" sz="1700" kern="1200" dirty="0"/>
         </a:p>
       </dsp:txBody>
       <dsp:txXfrm>
-        <a:off x="418832" y="1433024"/>
+        <a:off x="333108" y="1447166"/>
         <a:ext cx="5471693" cy="452844"/>
       </dsp:txXfrm>
     </dsp:sp>
@@ -8666,7 +8702,7 @@
       </dsp:nvSpPr>
       <dsp:spPr>
         <a:xfrm>
-          <a:off x="0" y="2966066"/>
+          <a:off x="0" y="3039691"/>
           <a:ext cx="7886699" cy="963900"/>
         </a:xfrm>
         <a:prstGeom prst="rect">
@@ -8733,7 +8769,7 @@
         </a:p>
       </dsp:txBody>
       <dsp:txXfrm>
-        <a:off x="0" y="2966066"/>
+        <a:off x="0" y="3039691"/>
         <a:ext cx="7886699" cy="963900"/>
       </dsp:txXfrm>
     </dsp:sp>
@@ -8744,7 +8780,7 @@
       </dsp:nvSpPr>
       <dsp:spPr>
         <a:xfrm>
-          <a:off x="394334" y="2715146"/>
+          <a:off x="234077" y="2764647"/>
           <a:ext cx="5520689" cy="501840"/>
         </a:xfrm>
         <a:prstGeom prst="roundRect">
@@ -8812,7 +8848,7 @@
         </a:p>
       </dsp:txBody>
       <dsp:txXfrm>
-        <a:off x="418832" y="2739644"/>
+        <a:off x="258575" y="2789145"/>
         <a:ext cx="5471693" cy="452844"/>
       </dsp:txXfrm>
     </dsp:sp>
@@ -9478,8 +9514,8 @@
       </dsp:nvSpPr>
       <dsp:spPr>
         <a:xfrm>
-          <a:off x="0" y="631221"/>
-          <a:ext cx="7886700" cy="1565679"/>
+          <a:off x="0" y="110340"/>
+          <a:ext cx="7886700" cy="2077919"/>
         </a:xfrm>
         <a:prstGeom prst="roundRect">
           <a:avLst/>
@@ -9521,12 +9557,12 @@
         </a:fontRef>
       </dsp:style>
       <dsp:txBody>
-        <a:bodyPr spcFirstLastPara="0" vert="horz" wrap="square" lIns="68580" tIns="68580" rIns="68580" bIns="68580" numCol="1" spcCol="1270" anchor="ctr" anchorCtr="0">
+        <a:bodyPr spcFirstLastPara="0" vert="horz" wrap="square" lIns="91440" tIns="91440" rIns="91440" bIns="91440" numCol="1" spcCol="1270" anchor="ctr" anchorCtr="0">
           <a:noAutofit/>
         </a:bodyPr>
         <a:lstStyle/>
         <a:p>
-          <a:pPr marL="0" lvl="0" indent="0" algn="l" defTabSz="800100">
+          <a:pPr marL="0" lvl="0" indent="0" algn="l" defTabSz="1066800">
             <a:lnSpc>
               <a:spcPct val="90000"/>
             </a:lnSpc>
@@ -9539,21 +9575,39 @@
             <a:buNone/>
           </a:pPr>
           <a:r>
-            <a:rPr lang="en-IN" sz="1800" kern="1200"/>
-            <a:t>C. Ng, S. Cheong, E. Haji mohammad hosseinmemar and W. Yap, "Mobile outdoor parking space detection application," 2017 IEEE 8th Control and System Graduate Research Colloquium (ICSGRC), 2017, pp. 81-86, doi: 10.1109/ICSGRC.2017.8070573.</a:t>
+            <a:rPr lang="en-IN" sz="2400" kern="1200" dirty="0"/>
+            <a:t>C. Ng, S. Cheong, E. Haji </a:t>
           </a:r>
           <a:r>
-            <a:rPr lang="en-IN" sz="1800" u="sng" kern="1200">
-              <a:hlinkClick xmlns:r="http://schemas.openxmlformats.org/officeDocument/2006/relationships" r:id="rId1"/>
-            </a:rPr>
-            <a:t>https://ieeexplore.ieee.org/document/8070573</a:t>
+            <a:rPr lang="en-IN" sz="2400" kern="1200" dirty="0" err="1"/>
+            <a:t>mohammad</a:t>
           </a:r>
-          <a:endParaRPr lang="en-US" sz="1800" kern="1200"/>
+          <a:r>
+            <a:rPr lang="en-IN" sz="2400" kern="1200" dirty="0"/>
+            <a:t> </a:t>
+          </a:r>
+          <a:r>
+            <a:rPr lang="en-IN" sz="2400" kern="1200" dirty="0" err="1"/>
+            <a:t>hosseinmemar</a:t>
+          </a:r>
+          <a:r>
+            <a:rPr lang="en-IN" sz="2400" kern="1200" dirty="0"/>
+            <a:t> and W. Yap, "Mobile outdoor parking space detection application," 2017 IEEE 8th Control and System Graduate Research Colloquium (ICSGRC), 2017, pp. 81-86, </a:t>
+          </a:r>
+          <a:r>
+            <a:rPr lang="en-IN" sz="2400" kern="1200" dirty="0" err="1"/>
+            <a:t>doi</a:t>
+          </a:r>
+          <a:r>
+            <a:rPr lang="en-IN" sz="2400" kern="1200" dirty="0"/>
+            <a:t>: 10.1109/ICSGRC.2017.8070573.</a:t>
+          </a:r>
+          <a:endParaRPr lang="en-US" sz="2400" kern="1200" dirty="0"/>
         </a:p>
       </dsp:txBody>
       <dsp:txXfrm>
-        <a:off x="76430" y="707651"/>
-        <a:ext cx="7733840" cy="1412819"/>
+        <a:off x="101436" y="211776"/>
+        <a:ext cx="7683828" cy="1875047"/>
       </dsp:txXfrm>
     </dsp:sp>
     <dsp:sp modelId="{EF702722-2301-48D6-A86E-C557ACBCF9B6}">
@@ -9563,8 +9617,8 @@
       </dsp:nvSpPr>
       <dsp:spPr>
         <a:xfrm>
-          <a:off x="0" y="2248740"/>
-          <a:ext cx="7886700" cy="1565679"/>
+          <a:off x="0" y="2257380"/>
+          <a:ext cx="7886700" cy="2077919"/>
         </a:xfrm>
         <a:prstGeom prst="roundRect">
           <a:avLst/>
@@ -9606,12 +9660,12 @@
         </a:fontRef>
       </dsp:style>
       <dsp:txBody>
-        <a:bodyPr spcFirstLastPara="0" vert="horz" wrap="square" lIns="68580" tIns="68580" rIns="68580" bIns="68580" numCol="1" spcCol="1270" anchor="ctr" anchorCtr="0">
+        <a:bodyPr spcFirstLastPara="0" vert="horz" wrap="square" lIns="91440" tIns="91440" rIns="91440" bIns="91440" numCol="1" spcCol="1270" anchor="ctr" anchorCtr="0">
           <a:noAutofit/>
         </a:bodyPr>
         <a:lstStyle/>
         <a:p>
-          <a:pPr marL="0" lvl="0" indent="0" algn="l" defTabSz="800100">
+          <a:pPr marL="0" lvl="0" indent="0" algn="l" defTabSz="1066800">
             <a:lnSpc>
               <a:spcPct val="90000"/>
             </a:lnSpc>
@@ -9624,21 +9678,39 @@
             <a:buNone/>
           </a:pPr>
           <a:r>
-            <a:rPr lang="en-IN" sz="1800" kern="1200"/>
-            <a:t>B. K. Patil, A. Deshpande, S. Suryavanshi, R. Magdum and B. Manjunath, "Smart Parking System for Cars," 2018 International Conference on Recent Innovations in Electrical, Electronics &amp; Communication Engineering (ICRIEECE), 2018, pp. 1118-1121, doi: 10.1109/ICRIEECE44171.2018.9008662. </a:t>
+            <a:rPr lang="en-IN" sz="2400" kern="1200" dirty="0"/>
+            <a:t>B. K. Patil, A. Deshpande, S. </a:t>
           </a:r>
           <a:r>
-            <a:rPr lang="en-IN" sz="1800" u="sng" kern="1200">
-              <a:hlinkClick xmlns:r="http://schemas.openxmlformats.org/officeDocument/2006/relationships" r:id="rId2"/>
-            </a:rPr>
-            <a:t>https://ieeexplore.ieee.org/document/9008662</a:t>
+            <a:rPr lang="en-IN" sz="2400" kern="1200" dirty="0" err="1"/>
+            <a:t>Suryavanshi</a:t>
           </a:r>
-          <a:endParaRPr lang="en-US" sz="1800" kern="1200"/>
+          <a:r>
+            <a:rPr lang="en-IN" sz="2400" kern="1200" dirty="0"/>
+            <a:t>, R. </a:t>
+          </a:r>
+          <a:r>
+            <a:rPr lang="en-IN" sz="2400" kern="1200" dirty="0" err="1"/>
+            <a:t>Magdum</a:t>
+          </a:r>
+          <a:r>
+            <a:rPr lang="en-IN" sz="2400" kern="1200" dirty="0"/>
+            <a:t> and B. Manjunath, "Smart Parking System for Cars," 2018 International Conference on Recent Innovations in Electrical, Electronics &amp; Communication Engineering (ICRIEECE), 2018, pp. 1118-1121, </a:t>
+          </a:r>
+          <a:r>
+            <a:rPr lang="en-IN" sz="2400" kern="1200" dirty="0" err="1"/>
+            <a:t>doi</a:t>
+          </a:r>
+          <a:r>
+            <a:rPr lang="en-IN" sz="2400" kern="1200" dirty="0"/>
+            <a:t>: 10.1109/ICRIEECE44171.2018.9008662. </a:t>
+          </a:r>
+          <a:endParaRPr lang="en-US" sz="2400" kern="1200" dirty="0"/>
         </a:p>
       </dsp:txBody>
       <dsp:txXfrm>
-        <a:off x="76430" y="2325170"/>
-        <a:ext cx="7733840" cy="1412819"/>
+        <a:off x="101436" y="2358816"/>
+        <a:ext cx="7683828" cy="1875047"/>
       </dsp:txXfrm>
     </dsp:sp>
   </dsp:spTree>
@@ -18454,8 +18526,8 @@
         </p:nvSpPr>
         <p:spPr>
           <a:xfrm>
-            <a:off x="404193" y="2570752"/>
-            <a:ext cx="8322733" cy="3724096"/>
+            <a:off x="571469" y="2632255"/>
+            <a:ext cx="8001062" cy="3724096"/>
           </a:xfrm>
           <a:prstGeom prst="rect">
             <a:avLst/>
@@ -18734,8 +18806,8 @@
         </p:nvSpPr>
         <p:spPr>
           <a:xfrm>
-            <a:off x="990600" y="897467"/>
-            <a:ext cx="7459133" cy="1754326"/>
+            <a:off x="522862" y="878613"/>
+            <a:ext cx="8098276" cy="1477328"/>
           </a:xfrm>
           <a:prstGeom prst="rect">
             <a:avLst/>
@@ -18772,7 +18844,7 @@
           <a:p>
             <a:pPr algn="ctr"/>
             <a:r>
-              <a:rPr lang="en-IN" sz="3600" dirty="0">
+              <a:rPr lang="en-IN" sz="3600" b="1" dirty="0">
                 <a:solidFill>
                   <a:schemeClr val="accent6">
                     <a:lumMod val="50000"/>
@@ -18782,11 +18854,8 @@
                 <a:ea typeface="Open Sans" panose="020B0606030504020204" pitchFamily="34" charset="0"/>
                 <a:cs typeface="Open Sans" panose="020B0606030504020204" pitchFamily="34" charset="0"/>
               </a:rPr>
-              <a:t>Title:  SMART PARKING APP</a:t>
+              <a:t>SMART PARKING APP for Android</a:t>
             </a:r>
-          </a:p>
-          <a:p>
-            <a:endParaRPr lang="en-IN" dirty="0"/>
           </a:p>
         </p:txBody>
       </p:sp>
@@ -19421,7 +19490,7 @@
           <p:nvPr>
             <p:extLst>
               <p:ext uri="{D42A27DB-BD31-4B8C-83A1-F6EECF244321}">
-                <p14:modId xmlns:p14="http://schemas.microsoft.com/office/powerpoint/2010/main" val="128204267"/>
+                <p14:modId xmlns:p14="http://schemas.microsoft.com/office/powerpoint/2010/main" val="2909615251"/>
               </p:ext>
             </p:extLst>
           </p:nvPr>
@@ -19828,7 +19897,13 @@
             </a:extLst>
           </p:cNvPr>
           <p:cNvGraphicFramePr/>
-          <p:nvPr/>
+          <p:nvPr>
+            <p:extLst>
+              <p:ext uri="{D42A27DB-BD31-4B8C-83A1-F6EECF244321}">
+                <p14:modId xmlns:p14="http://schemas.microsoft.com/office/powerpoint/2010/main" val="3344740897"/>
+              </p:ext>
+            </p:extLst>
+          </p:nvPr>
         </p:nvGraphicFramePr>
         <p:xfrm>
           <a:off x="628650" y="1891115"/>
@@ -20170,7 +20245,7 @@
         </p:nvSpPr>
         <p:spPr>
           <a:xfrm>
-            <a:off x="1456041" y="3008028"/>
+            <a:off x="1456041" y="2767280"/>
             <a:ext cx="6231918" cy="1323439"/>
           </a:xfrm>
           <a:prstGeom prst="rect">

</xml_diff>